<commit_message>
revise figures and content in model
</commit_message>
<xml_diff>
--- a/slides/DSI.pptx
+++ b/slides/DSI.pptx
@@ -295,7 +295,7 @@
           <a:p>
             <a:fld id="{530820CF-B880-4189-942D-D702A7CBA730}" type="datetimeFigureOut">
               <a:rPr lang="zh-CN" altLang="en-US" smtClean="0"/>
-              <a:t>2017-2-17</a:t>
+              <a:t>2017-2-18</a:t>
             </a:fld>
             <a:endParaRPr lang="zh-CN" altLang="en-US"/>
           </a:p>
@@ -460,7 +460,7 @@
           <a:p>
             <a:fld id="{530820CF-B880-4189-942D-D702A7CBA730}" type="datetimeFigureOut">
               <a:rPr lang="zh-CN" altLang="en-US" smtClean="0"/>
-              <a:t>2017-2-17</a:t>
+              <a:t>2017-2-18</a:t>
             </a:fld>
             <a:endParaRPr lang="zh-CN" altLang="en-US"/>
           </a:p>
@@ -635,7 +635,7 @@
           <a:p>
             <a:fld id="{530820CF-B880-4189-942D-D702A7CBA730}" type="datetimeFigureOut">
               <a:rPr lang="zh-CN" altLang="en-US" smtClean="0"/>
-              <a:t>2017-2-17</a:t>
+              <a:t>2017-2-18</a:t>
             </a:fld>
             <a:endParaRPr lang="zh-CN" altLang="en-US"/>
           </a:p>
@@ -800,7 +800,7 @@
           <a:p>
             <a:fld id="{530820CF-B880-4189-942D-D702A7CBA730}" type="datetimeFigureOut">
               <a:rPr lang="zh-CN" altLang="en-US" smtClean="0"/>
-              <a:t>2017-2-17</a:t>
+              <a:t>2017-2-18</a:t>
             </a:fld>
             <a:endParaRPr lang="zh-CN" altLang="en-US"/>
           </a:p>
@@ -1041,7 +1041,7 @@
           <a:p>
             <a:fld id="{530820CF-B880-4189-942D-D702A7CBA730}" type="datetimeFigureOut">
               <a:rPr lang="zh-CN" altLang="en-US" smtClean="0"/>
-              <a:t>2017-2-17</a:t>
+              <a:t>2017-2-18</a:t>
             </a:fld>
             <a:endParaRPr lang="zh-CN" altLang="en-US"/>
           </a:p>
@@ -1324,7 +1324,7 @@
           <a:p>
             <a:fld id="{530820CF-B880-4189-942D-D702A7CBA730}" type="datetimeFigureOut">
               <a:rPr lang="zh-CN" altLang="en-US" smtClean="0"/>
-              <a:t>2017-2-17</a:t>
+              <a:t>2017-2-18</a:t>
             </a:fld>
             <a:endParaRPr lang="zh-CN" altLang="en-US"/>
           </a:p>
@@ -1741,7 +1741,7 @@
           <a:p>
             <a:fld id="{530820CF-B880-4189-942D-D702A7CBA730}" type="datetimeFigureOut">
               <a:rPr lang="zh-CN" altLang="en-US" smtClean="0"/>
-              <a:t>2017-2-17</a:t>
+              <a:t>2017-2-18</a:t>
             </a:fld>
             <a:endParaRPr lang="zh-CN" altLang="en-US"/>
           </a:p>
@@ -1854,7 +1854,7 @@
           <a:p>
             <a:fld id="{530820CF-B880-4189-942D-D702A7CBA730}" type="datetimeFigureOut">
               <a:rPr lang="zh-CN" altLang="en-US" smtClean="0"/>
-              <a:t>2017-2-17</a:t>
+              <a:t>2017-2-18</a:t>
             </a:fld>
             <a:endParaRPr lang="zh-CN" altLang="en-US"/>
           </a:p>
@@ -1944,7 +1944,7 @@
           <a:p>
             <a:fld id="{530820CF-B880-4189-942D-D702A7CBA730}" type="datetimeFigureOut">
               <a:rPr lang="zh-CN" altLang="en-US" smtClean="0"/>
-              <a:t>2017-2-17</a:t>
+              <a:t>2017-2-18</a:t>
             </a:fld>
             <a:endParaRPr lang="zh-CN" altLang="en-US"/>
           </a:p>
@@ -2216,7 +2216,7 @@
           <a:p>
             <a:fld id="{530820CF-B880-4189-942D-D702A7CBA730}" type="datetimeFigureOut">
               <a:rPr lang="zh-CN" altLang="en-US" smtClean="0"/>
-              <a:t>2017-2-17</a:t>
+              <a:t>2017-2-18</a:t>
             </a:fld>
             <a:endParaRPr lang="zh-CN" altLang="en-US"/>
           </a:p>
@@ -2464,7 +2464,7 @@
           <a:p>
             <a:fld id="{530820CF-B880-4189-942D-D702A7CBA730}" type="datetimeFigureOut">
               <a:rPr lang="zh-CN" altLang="en-US" smtClean="0"/>
-              <a:t>2017-2-17</a:t>
+              <a:t>2017-2-18</a:t>
             </a:fld>
             <a:endParaRPr lang="zh-CN" altLang="en-US"/>
           </a:p>
@@ -2672,7 +2672,7 @@
           <a:p>
             <a:fld id="{530820CF-B880-4189-942D-D702A7CBA730}" type="datetimeFigureOut">
               <a:rPr lang="zh-CN" altLang="en-US" smtClean="0"/>
-              <a:t>2017-2-17</a:t>
+              <a:t>2017-2-18</a:t>
             </a:fld>
             <a:endParaRPr lang="zh-CN" altLang="en-US"/>
           </a:p>
@@ -3178,7 +3178,7 @@
           <a:graphicData uri="http://schemas.openxmlformats.org/presentationml/2006/ole">
             <mc:AlternateContent xmlns:mc="http://schemas.openxmlformats.org/markup-compatibility/2006">
               <mc:Choice xmlns:v="urn:schemas-microsoft-com:vml" Requires="v">
-                <p:oleObj spid="_x0000_s1607" name="Equation" r:id="rId3" imgW="215640" imgH="330120" progId="Equation.DSMT4">
+                <p:oleObj spid="_x0000_s1633" name="Equation" r:id="rId3" imgW="215640" imgH="330120" progId="Equation.DSMT4">
                   <p:embed/>
                 </p:oleObj>
               </mc:Choice>
@@ -3235,7 +3235,7 @@
           <a:graphicData uri="http://schemas.openxmlformats.org/presentationml/2006/ole">
             <mc:AlternateContent xmlns:mc="http://schemas.openxmlformats.org/markup-compatibility/2006">
               <mc:Choice xmlns:v="urn:schemas-microsoft-com:vml" Requires="v">
-                <p:oleObj spid="_x0000_s1608" name="Equation" r:id="rId5" imgW="241200" imgH="330120" progId="Equation.DSMT4">
+                <p:oleObj spid="_x0000_s1634" name="Equation" r:id="rId5" imgW="241200" imgH="330120" progId="Equation.DSMT4">
                   <p:embed/>
                 </p:oleObj>
               </mc:Choice>
@@ -3318,7 +3318,7 @@
           <a:graphicData uri="http://schemas.openxmlformats.org/presentationml/2006/ole">
             <mc:AlternateContent xmlns:mc="http://schemas.openxmlformats.org/markup-compatibility/2006">
               <mc:Choice xmlns:v="urn:schemas-microsoft-com:vml" Requires="v">
-                <p:oleObj spid="_x0000_s1609" name="Equation" r:id="rId7" imgW="215640" imgH="330120" progId="Equation.DSMT4">
+                <p:oleObj spid="_x0000_s1635" name="Equation" r:id="rId7" imgW="215640" imgH="330120" progId="Equation.DSMT4">
                   <p:embed/>
                 </p:oleObj>
               </mc:Choice>
@@ -3439,7 +3439,7 @@
           <a:graphicData uri="http://schemas.openxmlformats.org/presentationml/2006/ole">
             <mc:AlternateContent xmlns:mc="http://schemas.openxmlformats.org/markup-compatibility/2006">
               <mc:Choice xmlns:v="urn:schemas-microsoft-com:vml" Requires="v">
-                <p:oleObj spid="_x0000_s1610" name="Equation" r:id="rId9" imgW="203040" imgH="330120" progId="Equation.DSMT4">
+                <p:oleObj spid="_x0000_s1636" name="Equation" r:id="rId9" imgW="203040" imgH="330120" progId="Equation.DSMT4">
                   <p:embed/>
                 </p:oleObj>
               </mc:Choice>
@@ -3644,7 +3644,7 @@
           <a:graphicData uri="http://schemas.openxmlformats.org/presentationml/2006/ole">
             <mc:AlternateContent xmlns:mc="http://schemas.openxmlformats.org/markup-compatibility/2006">
               <mc:Choice xmlns:v="urn:schemas-microsoft-com:vml" Requires="v">
-                <p:oleObj spid="_x0000_s1611" name="Equation" r:id="rId11" imgW="228600" imgH="330120" progId="Equation.DSMT4">
+                <p:oleObj spid="_x0000_s1637" name="Equation" r:id="rId11" imgW="228600" imgH="330120" progId="Equation.DSMT4">
                   <p:embed/>
                 </p:oleObj>
               </mc:Choice>
@@ -3773,7 +3773,7 @@
           <a:graphicData uri="http://schemas.openxmlformats.org/presentationml/2006/ole">
             <mc:AlternateContent xmlns:mc="http://schemas.openxmlformats.org/markup-compatibility/2006">
               <mc:Choice xmlns:v="urn:schemas-microsoft-com:vml" Requires="v">
-                <p:oleObj spid="_x0000_s1612" name="Equation" r:id="rId13" imgW="203040" imgH="330120" progId="Equation.DSMT4">
+                <p:oleObj spid="_x0000_s1638" name="Equation" r:id="rId13" imgW="203040" imgH="330120" progId="Equation.DSMT4">
                   <p:embed/>
                 </p:oleObj>
               </mc:Choice>
@@ -4042,7 +4042,7 @@
           <a:graphicData uri="http://schemas.openxmlformats.org/presentationml/2006/ole">
             <mc:AlternateContent xmlns:mc="http://schemas.openxmlformats.org/markup-compatibility/2006">
               <mc:Choice xmlns:v="urn:schemas-microsoft-com:vml" Requires="v">
-                <p:oleObj spid="_x0000_s1613" name="Equation" r:id="rId15" imgW="203040" imgH="330120" progId="Equation.DSMT4">
+                <p:oleObj spid="_x0000_s1639" name="Equation" r:id="rId15" imgW="203040" imgH="330120" progId="Equation.DSMT4">
                   <p:embed/>
                 </p:oleObj>
               </mc:Choice>
@@ -4209,7 +4209,7 @@
           <a:graphicData uri="http://schemas.openxmlformats.org/presentationml/2006/ole">
             <mc:AlternateContent xmlns:mc="http://schemas.openxmlformats.org/markup-compatibility/2006">
               <mc:Choice xmlns:v="urn:schemas-microsoft-com:vml" Requires="v">
-                <p:oleObj spid="_x0000_s1614" name="Equation" r:id="rId17" imgW="228600" imgH="330120" progId="Equation.DSMT4">
+                <p:oleObj spid="_x0000_s1640" name="Equation" r:id="rId17" imgW="228600" imgH="330120" progId="Equation.DSMT4">
                   <p:embed/>
                 </p:oleObj>
               </mc:Choice>
@@ -4338,7 +4338,7 @@
           <a:graphicData uri="http://schemas.openxmlformats.org/presentationml/2006/ole">
             <mc:AlternateContent xmlns:mc="http://schemas.openxmlformats.org/markup-compatibility/2006">
               <mc:Choice xmlns:v="urn:schemas-microsoft-com:vml" Requires="v">
-                <p:oleObj spid="_x0000_s1615" name="Equation" r:id="rId19" imgW="203040" imgH="330120" progId="Equation.DSMT4">
+                <p:oleObj spid="_x0000_s1641" name="Equation" r:id="rId19" imgW="203040" imgH="330120" progId="Equation.DSMT4">
                   <p:embed/>
                 </p:oleObj>
               </mc:Choice>
@@ -4503,7 +4503,7 @@
           <a:graphicData uri="http://schemas.openxmlformats.org/presentationml/2006/ole">
             <mc:AlternateContent xmlns:mc="http://schemas.openxmlformats.org/markup-compatibility/2006">
               <mc:Choice xmlns:v="urn:schemas-microsoft-com:vml" Requires="v">
-                <p:oleObj spid="_x0000_s1616" name="Equation" r:id="rId21" imgW="190440" imgH="330120" progId="Equation.DSMT4">
+                <p:oleObj spid="_x0000_s1642" name="Equation" r:id="rId21" imgW="190440" imgH="330120" progId="Equation.DSMT4">
                   <p:embed/>
                 </p:oleObj>
               </mc:Choice>
@@ -4786,7 +4786,7 @@
           <a:graphicData uri="http://schemas.openxmlformats.org/presentationml/2006/ole">
             <mc:AlternateContent xmlns:mc="http://schemas.openxmlformats.org/markup-compatibility/2006">
               <mc:Choice xmlns:v="urn:schemas-microsoft-com:vml" Requires="v">
-                <p:oleObj spid="_x0000_s1617" name="Equation" r:id="rId23" imgW="228600" imgH="330120" progId="Equation.DSMT4">
+                <p:oleObj spid="_x0000_s1643" name="Equation" r:id="rId23" imgW="228600" imgH="330120" progId="Equation.DSMT4">
                   <p:embed/>
                 </p:oleObj>
               </mc:Choice>
@@ -4869,7 +4869,7 @@
           <a:graphicData uri="http://schemas.openxmlformats.org/presentationml/2006/ole">
             <mc:AlternateContent xmlns:mc="http://schemas.openxmlformats.org/markup-compatibility/2006">
               <mc:Choice xmlns:v="urn:schemas-microsoft-com:vml" Requires="v">
-                <p:oleObj spid="_x0000_s1618" name="Equation" r:id="rId25" imgW="253800" imgH="330120" progId="Equation.DSMT4">
+                <p:oleObj spid="_x0000_s1644" name="Equation" r:id="rId25" imgW="253800" imgH="330120" progId="Equation.DSMT4">
                   <p:embed/>
                 </p:oleObj>
               </mc:Choice>
@@ -4952,7 +4952,7 @@
           <a:graphicData uri="http://schemas.openxmlformats.org/presentationml/2006/ole">
             <mc:AlternateContent xmlns:mc="http://schemas.openxmlformats.org/markup-compatibility/2006">
               <mc:Choice xmlns:v="urn:schemas-microsoft-com:vml" Requires="v">
-                <p:oleObj spid="_x0000_s1619" name="Equation" r:id="rId27" imgW="228600" imgH="330120" progId="Equation.DSMT4">
+                <p:oleObj spid="_x0000_s1645" name="Equation" r:id="rId27" imgW="228600" imgH="330120" progId="Equation.DSMT4">
                   <p:embed/>
                 </p:oleObj>
               </mc:Choice>
@@ -5265,7 +5265,7 @@
           <a:graphicData uri="http://schemas.openxmlformats.org/presentationml/2006/ole">
             <mc:AlternateContent xmlns:mc="http://schemas.openxmlformats.org/markup-compatibility/2006">
               <mc:Choice xmlns:v="urn:schemas-microsoft-com:vml" Requires="v">
-                <p:oleObj spid="_x0000_s2349" name="Equation" r:id="rId3" imgW="203040" imgH="330120" progId="Equation.DSMT4">
+                <p:oleObj spid="_x0000_s2363" name="Equation" r:id="rId3" imgW="203040" imgH="330120" progId="Equation.DSMT4">
                   <p:embed/>
                 </p:oleObj>
               </mc:Choice>
@@ -5394,7 +5394,7 @@
           <a:graphicData uri="http://schemas.openxmlformats.org/presentationml/2006/ole">
             <mc:AlternateContent xmlns:mc="http://schemas.openxmlformats.org/markup-compatibility/2006">
               <mc:Choice xmlns:v="urn:schemas-microsoft-com:vml" Requires="v">
-                <p:oleObj spid="_x0000_s2350" name="Equation" r:id="rId5" imgW="203040" imgH="330120" progId="Equation.DSMT4">
+                <p:oleObj spid="_x0000_s2364" name="Equation" r:id="rId5" imgW="203040" imgH="330120" progId="Equation.DSMT4">
                   <p:embed/>
                 </p:oleObj>
               </mc:Choice>
@@ -5523,7 +5523,7 @@
           <a:graphicData uri="http://schemas.openxmlformats.org/presentationml/2006/ole">
             <mc:AlternateContent xmlns:mc="http://schemas.openxmlformats.org/markup-compatibility/2006">
               <mc:Choice xmlns:v="urn:schemas-microsoft-com:vml" Requires="v">
-                <p:oleObj spid="_x0000_s2351" name="Equation" r:id="rId7" imgW="215640" imgH="330120" progId="Equation.DSMT4">
+                <p:oleObj spid="_x0000_s2365" name="Equation" r:id="rId7" imgW="215640" imgH="330120" progId="Equation.DSMT4">
                   <p:embed/>
                 </p:oleObj>
               </mc:Choice>
@@ -5666,7 +5666,7 @@
             <a:graphicData uri="http://schemas.openxmlformats.org/presentationml/2006/ole">
               <mc:AlternateContent xmlns:mc="http://schemas.openxmlformats.org/markup-compatibility/2006">
                 <mc:Choice xmlns:v="urn:schemas-microsoft-com:vml" Requires="v">
-                  <p:oleObj spid="_x0000_s2352" name="Equation" r:id="rId9" imgW="342720" imgH="330120" progId="Equation.DSMT4">
+                  <p:oleObj spid="_x0000_s2366" name="Equation" r:id="rId9" imgW="342720" imgH="330120" progId="Equation.DSMT4">
                     <p:embed/>
                   </p:oleObj>
                 </mc:Choice>
@@ -5796,7 +5796,7 @@
           <a:graphicData uri="http://schemas.openxmlformats.org/presentationml/2006/ole">
             <mc:AlternateContent xmlns:mc="http://schemas.openxmlformats.org/markup-compatibility/2006">
               <mc:Choice xmlns:v="urn:schemas-microsoft-com:vml" Requires="v">
-                <p:oleObj spid="_x0000_s2353" name="Equation" r:id="rId11" imgW="355320" imgH="330120" progId="Equation.DSMT4">
+                <p:oleObj spid="_x0000_s2367" name="Equation" r:id="rId11" imgW="355320" imgH="330120" progId="Equation.DSMT4">
                   <p:embed/>
                 </p:oleObj>
               </mc:Choice>
@@ -5978,7 +5978,7 @@
             <a:graphicData uri="http://schemas.openxmlformats.org/presentationml/2006/ole">
               <mc:AlternateContent xmlns:mc="http://schemas.openxmlformats.org/markup-compatibility/2006">
                 <mc:Choice xmlns:v="urn:schemas-microsoft-com:vml" Requires="v">
-                  <p:oleObj spid="_x0000_s2354" name="Equation" r:id="rId13" imgW="190440" imgH="330120" progId="Equation.DSMT4">
+                  <p:oleObj spid="_x0000_s2368" name="Equation" r:id="rId13" imgW="190440" imgH="330120" progId="Equation.DSMT4">
                     <p:embed/>
                   </p:oleObj>
                 </mc:Choice>
@@ -6186,7 +6186,7 @@
           <a:graphicData uri="http://schemas.openxmlformats.org/presentationml/2006/ole">
             <mc:AlternateContent xmlns:mc="http://schemas.openxmlformats.org/markup-compatibility/2006">
               <mc:Choice xmlns:v="urn:schemas-microsoft-com:vml" Requires="v">
-                <p:oleObj spid="_x0000_s2355" name="Equation" r:id="rId15" imgW="342720" imgH="330120" progId="Equation.DSMT4">
+                <p:oleObj spid="_x0000_s2369" name="Equation" r:id="rId15" imgW="342720" imgH="330120" progId="Equation.DSMT4">
                   <p:embed/>
                 </p:oleObj>
               </mc:Choice>
@@ -6992,7 +6992,7 @@
             <a:graphicData uri="http://schemas.openxmlformats.org/presentationml/2006/ole">
               <mc:AlternateContent xmlns:mc="http://schemas.openxmlformats.org/markup-compatibility/2006">
                 <mc:Choice xmlns:v="urn:schemas-microsoft-com:vml" Requires="v">
-                  <p:oleObj spid="_x0000_s3445" name="Equation" r:id="rId3" imgW="203040" imgH="330120" progId="Equation.DSMT4">
+                  <p:oleObj spid="_x0000_s3463" name="Equation" r:id="rId3" imgW="203040" imgH="330120" progId="Equation.DSMT4">
                     <p:embed/>
                   </p:oleObj>
                 </mc:Choice>
@@ -7136,7 +7136,7 @@
             <a:graphicData uri="http://schemas.openxmlformats.org/presentationml/2006/ole">
               <mc:AlternateContent xmlns:mc="http://schemas.openxmlformats.org/markup-compatibility/2006">
                 <mc:Choice xmlns:v="urn:schemas-microsoft-com:vml" Requires="v">
-                  <p:oleObj spid="_x0000_s3446" name="Equation" r:id="rId5" imgW="203040" imgH="330120" progId="Equation.DSMT4">
+                  <p:oleObj spid="_x0000_s3464" name="Equation" r:id="rId5" imgW="203040" imgH="330120" progId="Equation.DSMT4">
                     <p:embed/>
                   </p:oleObj>
                 </mc:Choice>
@@ -7287,7 +7287,7 @@
             <a:graphicData uri="http://schemas.openxmlformats.org/presentationml/2006/ole">
               <mc:AlternateContent xmlns:mc="http://schemas.openxmlformats.org/markup-compatibility/2006">
                 <mc:Choice xmlns:v="urn:schemas-microsoft-com:vml" Requires="v">
-                  <p:oleObj spid="_x0000_s3447" name="Equation" r:id="rId7" imgW="215640" imgH="330120" progId="Equation.DSMT4">
+                  <p:oleObj spid="_x0000_s3465" name="Equation" r:id="rId7" imgW="215640" imgH="330120" progId="Equation.DSMT4">
                     <p:embed/>
                   </p:oleObj>
                 </mc:Choice>
@@ -7431,7 +7431,7 @@
             <a:graphicData uri="http://schemas.openxmlformats.org/presentationml/2006/ole">
               <mc:AlternateContent xmlns:mc="http://schemas.openxmlformats.org/markup-compatibility/2006">
                 <mc:Choice xmlns:v="urn:schemas-microsoft-com:vml" Requires="v">
-                  <p:oleObj spid="_x0000_s3448" name="Equation" r:id="rId9" imgW="342720" imgH="330120" progId="Equation.DSMT4">
+                  <p:oleObj spid="_x0000_s3466" name="Equation" r:id="rId9" imgW="342720" imgH="330120" progId="Equation.DSMT4">
                     <p:embed/>
                   </p:oleObj>
                 </mc:Choice>
@@ -7582,7 +7582,7 @@
             <a:graphicData uri="http://schemas.openxmlformats.org/presentationml/2006/ole">
               <mc:AlternateContent xmlns:mc="http://schemas.openxmlformats.org/markup-compatibility/2006">
                 <mc:Choice xmlns:v="urn:schemas-microsoft-com:vml" Requires="v">
-                  <p:oleObj spid="_x0000_s3449" name="Equation" r:id="rId11" imgW="355320" imgH="330120" progId="Equation.DSMT4">
+                  <p:oleObj spid="_x0000_s3467" name="Equation" r:id="rId11" imgW="355320" imgH="330120" progId="Equation.DSMT4">
                     <p:embed/>
                   </p:oleObj>
                 </mc:Choice>
@@ -7765,7 +7765,7 @@
             <a:graphicData uri="http://schemas.openxmlformats.org/presentationml/2006/ole">
               <mc:AlternateContent xmlns:mc="http://schemas.openxmlformats.org/markup-compatibility/2006">
                 <mc:Choice xmlns:v="urn:schemas-microsoft-com:vml" Requires="v">
-                  <p:oleObj spid="_x0000_s3450" name="Equation" r:id="rId13" imgW="190440" imgH="330120" progId="Equation.DSMT4">
+                  <p:oleObj spid="_x0000_s3468" name="Equation" r:id="rId13" imgW="190440" imgH="330120" progId="Equation.DSMT4">
                     <p:embed/>
                   </p:oleObj>
                 </mc:Choice>
@@ -7987,7 +7987,7 @@
             <a:graphicData uri="http://schemas.openxmlformats.org/presentationml/2006/ole">
               <mc:AlternateContent xmlns:mc="http://schemas.openxmlformats.org/markup-compatibility/2006">
                 <mc:Choice xmlns:v="urn:schemas-microsoft-com:vml" Requires="v">
-                  <p:oleObj spid="_x0000_s3451" name="Equation" r:id="rId15" imgW="342720" imgH="330120" progId="Equation.DSMT4">
+                  <p:oleObj spid="_x0000_s3469" name="Equation" r:id="rId15" imgW="342720" imgH="330120" progId="Equation.DSMT4">
                     <p:embed/>
                   </p:oleObj>
                 </mc:Choice>
@@ -8641,7 +8641,7 @@
             <a:graphicData uri="http://schemas.openxmlformats.org/presentationml/2006/ole">
               <mc:AlternateContent xmlns:mc="http://schemas.openxmlformats.org/markup-compatibility/2006">
                 <mc:Choice xmlns:v="urn:schemas-microsoft-com:vml" Requires="v">
-                  <p:oleObj spid="_x0000_s3452" name="Equation" r:id="rId17" imgW="253800" imgH="330120" progId="Equation.DSMT4">
+                  <p:oleObj spid="_x0000_s3470" name="Equation" r:id="rId17" imgW="253800" imgH="330120" progId="Equation.DSMT4">
                     <p:embed/>
                   </p:oleObj>
                 </mc:Choice>
@@ -9180,7 +9180,7 @@
             <a:graphicData uri="http://schemas.openxmlformats.org/presentationml/2006/ole">
               <mc:AlternateContent xmlns:mc="http://schemas.openxmlformats.org/markup-compatibility/2006">
                 <mc:Choice xmlns:v="urn:schemas-microsoft-com:vml" Requires="v">
-                  <p:oleObj spid="_x0000_s3453" name="Equation" r:id="rId19" imgW="228600" imgH="330120" progId="Equation.DSMT4">
+                  <p:oleObj spid="_x0000_s3471" name="Equation" r:id="rId19" imgW="228600" imgH="330120" progId="Equation.DSMT4">
                     <p:embed/>
                   </p:oleObj>
                 </mc:Choice>
@@ -9484,7 +9484,7 @@
             <a:graphicData uri="http://schemas.openxmlformats.org/presentationml/2006/ole">
               <mc:AlternateContent xmlns:mc="http://schemas.openxmlformats.org/markup-compatibility/2006">
                 <mc:Choice xmlns:v="urn:schemas-microsoft-com:vml" Requires="v">
-                  <p:oleObj spid="_x0000_s4338" name="Equation" r:id="rId3" imgW="203040" imgH="330120" progId="Equation.DSMT4">
+                  <p:oleObj spid="_x0000_s4354" name="Equation" r:id="rId3" imgW="203040" imgH="330120" progId="Equation.DSMT4">
                     <p:embed/>
                   </p:oleObj>
                 </mc:Choice>
@@ -9635,7 +9635,7 @@
             <a:graphicData uri="http://schemas.openxmlformats.org/presentationml/2006/ole">
               <mc:AlternateContent xmlns:mc="http://schemas.openxmlformats.org/markup-compatibility/2006">
                 <mc:Choice xmlns:v="urn:schemas-microsoft-com:vml" Requires="v">
-                  <p:oleObj spid="_x0000_s4339" name="Equation" r:id="rId5" imgW="215640" imgH="330120" progId="Equation.DSMT4">
+                  <p:oleObj spid="_x0000_s4355" name="Equation" r:id="rId5" imgW="215640" imgH="330120" progId="Equation.DSMT4">
                     <p:embed/>
                   </p:oleObj>
                 </mc:Choice>
@@ -9779,7 +9779,7 @@
             <a:graphicData uri="http://schemas.openxmlformats.org/presentationml/2006/ole">
               <mc:AlternateContent xmlns:mc="http://schemas.openxmlformats.org/markup-compatibility/2006">
                 <mc:Choice xmlns:v="urn:schemas-microsoft-com:vml" Requires="v">
-                  <p:oleObj spid="_x0000_s4340" name="Equation" r:id="rId7" imgW="330120" imgH="330120" progId="Equation.DSMT4">
+                  <p:oleObj spid="_x0000_s4356" name="Equation" r:id="rId7" imgW="330120" imgH="330120" progId="Equation.DSMT4">
                     <p:embed/>
                   </p:oleObj>
                 </mc:Choice>
@@ -9930,7 +9930,7 @@
             <a:graphicData uri="http://schemas.openxmlformats.org/presentationml/2006/ole">
               <mc:AlternateContent xmlns:mc="http://schemas.openxmlformats.org/markup-compatibility/2006">
                 <mc:Choice xmlns:v="urn:schemas-microsoft-com:vml" Requires="v">
-                  <p:oleObj spid="_x0000_s4341" name="Equation" r:id="rId9" imgW="355320" imgH="330120" progId="Equation.DSMT4">
+                  <p:oleObj spid="_x0000_s4357" name="Equation" r:id="rId9" imgW="355320" imgH="330120" progId="Equation.DSMT4">
                     <p:embed/>
                   </p:oleObj>
                 </mc:Choice>
@@ -10113,7 +10113,7 @@
             <a:graphicData uri="http://schemas.openxmlformats.org/presentationml/2006/ole">
               <mc:AlternateContent xmlns:mc="http://schemas.openxmlformats.org/markup-compatibility/2006">
                 <mc:Choice xmlns:v="urn:schemas-microsoft-com:vml" Requires="v">
-                  <p:oleObj spid="_x0000_s4342" name="Equation" r:id="rId11" imgW="190440" imgH="330120" progId="Equation.DSMT4">
+                  <p:oleObj spid="_x0000_s4358" name="Equation" r:id="rId11" imgW="190440" imgH="330120" progId="Equation.DSMT4">
                     <p:embed/>
                   </p:oleObj>
                 </mc:Choice>
@@ -10335,7 +10335,7 @@
             <a:graphicData uri="http://schemas.openxmlformats.org/presentationml/2006/ole">
               <mc:AlternateContent xmlns:mc="http://schemas.openxmlformats.org/markup-compatibility/2006">
                 <mc:Choice xmlns:v="urn:schemas-microsoft-com:vml" Requires="v">
-                  <p:oleObj spid="_x0000_s4343" name="Equation" r:id="rId13" imgW="342720" imgH="330120" progId="Equation.DSMT4">
+                  <p:oleObj spid="_x0000_s4359" name="Equation" r:id="rId13" imgW="342720" imgH="330120" progId="Equation.DSMT4">
                     <p:embed/>
                   </p:oleObj>
                 </mc:Choice>
@@ -10851,7 +10851,7 @@
             <a:graphicData uri="http://schemas.openxmlformats.org/presentationml/2006/ole">
               <mc:AlternateContent xmlns:mc="http://schemas.openxmlformats.org/markup-compatibility/2006">
                 <mc:Choice xmlns:v="urn:schemas-microsoft-com:vml" Requires="v">
-                  <p:oleObj spid="_x0000_s4344" name="Equation" r:id="rId15" imgW="253800" imgH="330120" progId="Equation.DSMT4">
+                  <p:oleObj spid="_x0000_s4360" name="Equation" r:id="rId15" imgW="253800" imgH="330120" progId="Equation.DSMT4">
                     <p:embed/>
                   </p:oleObj>
                 </mc:Choice>
@@ -11311,7 +11311,7 @@
             <a:graphicData uri="http://schemas.openxmlformats.org/presentationml/2006/ole">
               <mc:AlternateContent xmlns:mc="http://schemas.openxmlformats.org/markup-compatibility/2006">
                 <mc:Choice xmlns:v="urn:schemas-microsoft-com:vml" Requires="v">
-                  <p:oleObj spid="_x0000_s4345" name="Equation" r:id="rId17" imgW="228600" imgH="330120" progId="Equation.DSMT4">
+                  <p:oleObj spid="_x0000_s4361" name="Equation" r:id="rId17" imgW="228600" imgH="330120" progId="Equation.DSMT4">
                     <p:embed/>
                   </p:oleObj>
                 </mc:Choice>
@@ -12248,14 +12248,7 @@
                 <a:latin typeface="Times New Roman" panose="02020603050405020304" pitchFamily="18" charset="0"/>
                 <a:cs typeface="Times New Roman" panose="02020603050405020304" pitchFamily="18" charset="0"/>
               </a:rPr>
-              <a:t>Attention </a:t>
-            </a:r>
-            <a:r>
-              <a:rPr lang="en-US" altLang="zh-CN" sz="2000" dirty="0" smtClean="0">
-                <a:latin typeface="Times New Roman" panose="02020603050405020304" pitchFamily="18" charset="0"/>
-                <a:cs typeface="Times New Roman" panose="02020603050405020304" pitchFamily="18" charset="0"/>
-              </a:rPr>
-              <a:t>function</a:t>
+              <a:t>Attention function</a:t>
             </a:r>
             <a:endParaRPr lang="zh-CN" altLang="en-US" sz="2000" dirty="0">
               <a:latin typeface="Times New Roman" panose="02020603050405020304" pitchFamily="18" charset="0"/>
@@ -14704,11 +14697,18 @@
           <a:p>
             <a:pPr algn="ctr"/>
             <a:r>
-              <a:rPr lang="en-US" altLang="zh-CN" dirty="0" smtClean="0">
+              <a:rPr lang="en-US" altLang="zh-CN" sz="2000" dirty="0" smtClean="0">
                 <a:latin typeface="Times New Roman" panose="02020603050405020304" pitchFamily="18" charset="0"/>
                 <a:cs typeface="Times New Roman" panose="02020603050405020304" pitchFamily="18" charset="0"/>
               </a:rPr>
-              <a:t>attention</a:t>
+              <a:t>a</a:t>
+            </a:r>
+            <a:r>
+              <a:rPr lang="en-US" altLang="zh-CN" sz="2000" dirty="0">
+                <a:latin typeface="Times New Roman" panose="02020603050405020304" pitchFamily="18" charset="0"/>
+                <a:cs typeface="Times New Roman" panose="02020603050405020304" pitchFamily="18" charset="0"/>
+              </a:rPr>
+              <a:t>(•)</a:t>
             </a:r>
             <a:endParaRPr lang="zh-CN" altLang="en-US" dirty="0">
               <a:latin typeface="Times New Roman" panose="02020603050405020304" pitchFamily="18" charset="0"/>
@@ -15803,11 +15803,18 @@
           <a:p>
             <a:pPr algn="ctr"/>
             <a:r>
-              <a:rPr lang="en-US" altLang="zh-CN" dirty="0" smtClean="0">
+              <a:rPr lang="en-US" altLang="zh-CN" sz="2000" dirty="0" smtClean="0">
                 <a:latin typeface="Times New Roman" panose="02020603050405020304" pitchFamily="18" charset="0"/>
                 <a:cs typeface="Times New Roman" panose="02020603050405020304" pitchFamily="18" charset="0"/>
               </a:rPr>
-              <a:t>attention</a:t>
+              <a:t>a</a:t>
+            </a:r>
+            <a:r>
+              <a:rPr lang="en-US" altLang="zh-CN" sz="2000" dirty="0">
+                <a:latin typeface="Times New Roman" panose="02020603050405020304" pitchFamily="18" charset="0"/>
+                <a:cs typeface="Times New Roman" panose="02020603050405020304" pitchFamily="18" charset="0"/>
+              </a:rPr>
+              <a:t>(•)</a:t>
             </a:r>
             <a:endParaRPr lang="zh-CN" altLang="en-US" dirty="0">
               <a:latin typeface="Times New Roman" panose="02020603050405020304" pitchFamily="18" charset="0"/>
@@ -17158,7 +17165,7 @@
           <a:graphicData uri="http://schemas.openxmlformats.org/presentationml/2006/ole">
             <mc:AlternateContent xmlns:mc="http://schemas.openxmlformats.org/markup-compatibility/2006">
               <mc:Choice xmlns:v="urn:schemas-microsoft-com:vml" Requires="v">
-                <p:oleObj spid="_x0000_s7530" name="Equation" r:id="rId3" imgW="215640" imgH="330120" progId="Equation.DSMT4">
+                <p:oleObj spid="_x0000_s7570" name="Equation" r:id="rId3" imgW="215640" imgH="330120" progId="Equation.DSMT4">
                   <p:embed/>
                 </p:oleObj>
               </mc:Choice>
@@ -17309,7 +17316,7 @@
             <a:graphicData uri="http://schemas.openxmlformats.org/presentationml/2006/ole">
               <mc:AlternateContent xmlns:mc="http://schemas.openxmlformats.org/markup-compatibility/2006">
                 <mc:Choice xmlns:v="urn:schemas-microsoft-com:vml" Requires="v">
-                  <p:oleObj spid="_x0000_s7531" name="Equation" r:id="rId5" imgW="406080" imgH="330120" progId="Equation.DSMT4">
+                  <p:oleObj spid="_x0000_s7571" name="Equation" r:id="rId5" imgW="406080" imgH="330120" progId="Equation.DSMT4">
                     <p:embed/>
                   </p:oleObj>
                 </mc:Choice>
@@ -17461,7 +17468,7 @@
             <a:graphicData uri="http://schemas.openxmlformats.org/presentationml/2006/ole">
               <mc:AlternateContent xmlns:mc="http://schemas.openxmlformats.org/markup-compatibility/2006">
                 <mc:Choice xmlns:v="urn:schemas-microsoft-com:vml" Requires="v">
-                  <p:oleObj spid="_x0000_s7532" name="Equation" r:id="rId7" imgW="241200" imgH="330120" progId="Equation.DSMT4">
+                  <p:oleObj spid="_x0000_s7572" name="Equation" r:id="rId7" imgW="241200" imgH="330120" progId="Equation.DSMT4">
                     <p:embed/>
                   </p:oleObj>
                 </mc:Choice>
@@ -17652,7 +17659,7 @@
             <a:graphicData uri="http://schemas.openxmlformats.org/presentationml/2006/ole">
               <mc:AlternateContent xmlns:mc="http://schemas.openxmlformats.org/markup-compatibility/2006">
                 <mc:Choice xmlns:v="urn:schemas-microsoft-com:vml" Requires="v">
-                  <p:oleObj spid="_x0000_s7533" name="Equation" r:id="rId9" imgW="203040" imgH="330120" progId="Equation.DSMT4">
+                  <p:oleObj spid="_x0000_s7573" name="Equation" r:id="rId9" imgW="203040" imgH="330120" progId="Equation.DSMT4">
                     <p:embed/>
                   </p:oleObj>
                 </mc:Choice>
@@ -17843,7 +17850,7 @@
             <a:graphicData uri="http://schemas.openxmlformats.org/presentationml/2006/ole">
               <mc:AlternateContent xmlns:mc="http://schemas.openxmlformats.org/markup-compatibility/2006">
                 <mc:Choice xmlns:v="urn:schemas-microsoft-com:vml" Requires="v">
-                  <p:oleObj spid="_x0000_s7534" name="Equation" r:id="rId11" imgW="419040" imgH="330120" progId="Equation.DSMT4">
+                  <p:oleObj spid="_x0000_s7574" name="Equation" r:id="rId11" imgW="419040" imgH="330120" progId="Equation.DSMT4">
                     <p:embed/>
                   </p:oleObj>
                 </mc:Choice>
@@ -18029,7 +18036,7 @@
           <a:graphicData uri="http://schemas.openxmlformats.org/presentationml/2006/ole">
             <mc:AlternateContent xmlns:mc="http://schemas.openxmlformats.org/markup-compatibility/2006">
               <mc:Choice xmlns:v="urn:schemas-microsoft-com:vml" Requires="v">
-                <p:oleObj spid="_x0000_s7535" name="Equation" r:id="rId13" imgW="380880" imgH="330120" progId="Equation.DSMT4">
+                <p:oleObj spid="_x0000_s7575" name="Equation" r:id="rId13" imgW="380880" imgH="330120" progId="Equation.DSMT4">
                   <p:embed/>
                 </p:oleObj>
               </mc:Choice>
@@ -18112,7 +18119,7 @@
           <a:graphicData uri="http://schemas.openxmlformats.org/presentationml/2006/ole">
             <mc:AlternateContent xmlns:mc="http://schemas.openxmlformats.org/markup-compatibility/2006">
               <mc:Choice xmlns:v="urn:schemas-microsoft-com:vml" Requires="v">
-                <p:oleObj spid="_x0000_s7536" name="Equation" r:id="rId15" imgW="241200" imgH="330120" progId="Equation.DSMT4">
+                <p:oleObj spid="_x0000_s7576" name="Equation" r:id="rId15" imgW="241200" imgH="330120" progId="Equation.DSMT4">
                   <p:embed/>
                 </p:oleObj>
               </mc:Choice>
@@ -18195,7 +18202,7 @@
           <a:graphicData uri="http://schemas.openxmlformats.org/presentationml/2006/ole">
             <mc:AlternateContent xmlns:mc="http://schemas.openxmlformats.org/markup-compatibility/2006">
               <mc:Choice xmlns:v="urn:schemas-microsoft-com:vml" Requires="v">
-                <p:oleObj spid="_x0000_s7537" name="Equation" r:id="rId17" imgW="431640" imgH="330120" progId="Equation.DSMT4">
+                <p:oleObj spid="_x0000_s7577" name="Equation" r:id="rId17" imgW="431640" imgH="330120" progId="Equation.DSMT4">
                   <p:embed/>
                 </p:oleObj>
               </mc:Choice>
@@ -18346,7 +18353,7 @@
             <a:graphicData uri="http://schemas.openxmlformats.org/presentationml/2006/ole">
               <mc:AlternateContent xmlns:mc="http://schemas.openxmlformats.org/markup-compatibility/2006">
                 <mc:Choice xmlns:v="urn:schemas-microsoft-com:vml" Requires="v">
-                  <p:oleObj spid="_x0000_s7538" name="Equation" r:id="rId19" imgW="380880" imgH="330120" progId="Equation.DSMT4">
+                  <p:oleObj spid="_x0000_s7578" name="Equation" r:id="rId19" imgW="380880" imgH="330120" progId="Equation.DSMT4">
                     <p:embed/>
                   </p:oleObj>
                 </mc:Choice>
@@ -18430,7 +18437,7 @@
           <a:graphicData uri="http://schemas.openxmlformats.org/presentationml/2006/ole">
             <mc:AlternateContent xmlns:mc="http://schemas.openxmlformats.org/markup-compatibility/2006">
               <mc:Choice xmlns:v="urn:schemas-microsoft-com:vml" Requires="v">
-                <p:oleObj spid="_x0000_s7539" name="Equation" r:id="rId21" imgW="419040" imgH="330120" progId="Equation.DSMT4">
+                <p:oleObj spid="_x0000_s7579" name="Equation" r:id="rId21" imgW="419040" imgH="330120" progId="Equation.DSMT4">
                   <p:embed/>
                 </p:oleObj>
               </mc:Choice>
@@ -18896,7 +18903,7 @@
             <a:graphicData uri="http://schemas.openxmlformats.org/presentationml/2006/ole">
               <mc:AlternateContent xmlns:mc="http://schemas.openxmlformats.org/markup-compatibility/2006">
                 <mc:Choice xmlns:v="urn:schemas-microsoft-com:vml" Requires="v">
-                  <p:oleObj spid="_x0000_s7540" name="Equation" r:id="rId23" imgW="228600" imgH="330120" progId="Equation.DSMT4">
+                  <p:oleObj spid="_x0000_s7580" name="Equation" r:id="rId23" imgW="228600" imgH="330120" progId="Equation.DSMT4">
                     <p:embed/>
                   </p:oleObj>
                 </mc:Choice>
@@ -19086,7 +19093,7 @@
             <a:graphicData uri="http://schemas.openxmlformats.org/presentationml/2006/ole">
               <mc:AlternateContent xmlns:mc="http://schemas.openxmlformats.org/markup-compatibility/2006">
                 <mc:Choice xmlns:v="urn:schemas-microsoft-com:vml" Requires="v">
-                  <p:oleObj spid="_x0000_s7541" name="Equation" r:id="rId25" imgW="190440" imgH="330120" progId="Equation.DSMT4">
+                  <p:oleObj spid="_x0000_s7581" name="Equation" r:id="rId25" imgW="190440" imgH="330120" progId="Equation.DSMT4">
                     <p:embed/>
                   </p:oleObj>
                 </mc:Choice>
@@ -19277,7 +19284,7 @@
             <a:graphicData uri="http://schemas.openxmlformats.org/presentationml/2006/ole">
               <mc:AlternateContent xmlns:mc="http://schemas.openxmlformats.org/markup-compatibility/2006">
                 <mc:Choice xmlns:v="urn:schemas-microsoft-com:vml" Requires="v">
-                  <p:oleObj spid="_x0000_s7542" name="Equation" r:id="rId27" imgW="330120" imgH="330120" progId="Equation.DSMT4">
+                  <p:oleObj spid="_x0000_s7582" name="Equation" r:id="rId27" imgW="330120" imgH="330120" progId="Equation.DSMT4">
                     <p:embed/>
                   </p:oleObj>
                 </mc:Choice>
@@ -19753,7 +19760,7 @@
           <a:graphicData uri="http://schemas.openxmlformats.org/presentationml/2006/ole">
             <mc:AlternateContent xmlns:mc="http://schemas.openxmlformats.org/markup-compatibility/2006">
               <mc:Choice xmlns:v="urn:schemas-microsoft-com:vml" Requires="v">
-                <p:oleObj spid="_x0000_s7543" name="Equation" r:id="rId29" imgW="241200" imgH="330120" progId="Equation.DSMT4">
+                <p:oleObj spid="_x0000_s7583" name="Equation" r:id="rId29" imgW="241200" imgH="330120" progId="Equation.DSMT4">
                   <p:embed/>
                 </p:oleObj>
               </mc:Choice>
@@ -19836,7 +19843,7 @@
           <a:graphicData uri="http://schemas.openxmlformats.org/presentationml/2006/ole">
             <mc:AlternateContent xmlns:mc="http://schemas.openxmlformats.org/markup-compatibility/2006">
               <mc:Choice xmlns:v="urn:schemas-microsoft-com:vml" Requires="v">
-                <p:oleObj spid="_x0000_s7544" name="Equation" r:id="rId31" imgW="241200" imgH="330120" progId="Equation.DSMT4">
+                <p:oleObj spid="_x0000_s7584" name="Equation" r:id="rId31" imgW="241200" imgH="330120" progId="Equation.DSMT4">
                   <p:embed/>
                 </p:oleObj>
               </mc:Choice>
@@ -19919,7 +19926,7 @@
           <a:graphicData uri="http://schemas.openxmlformats.org/presentationml/2006/ole">
             <mc:AlternateContent xmlns:mc="http://schemas.openxmlformats.org/markup-compatibility/2006">
               <mc:Choice xmlns:v="urn:schemas-microsoft-com:vml" Requires="v">
-                <p:oleObj spid="_x0000_s7545" name="Equation" r:id="rId33" imgW="393480" imgH="330120" progId="Equation.DSMT4">
+                <p:oleObj spid="_x0000_s7585" name="Equation" r:id="rId33" imgW="393480" imgH="330120" progId="Equation.DSMT4">
                   <p:embed/>
                 </p:oleObj>
               </mc:Choice>
@@ -20002,7 +20009,7 @@
           <a:graphicData uri="http://schemas.openxmlformats.org/presentationml/2006/ole">
             <mc:AlternateContent xmlns:mc="http://schemas.openxmlformats.org/markup-compatibility/2006">
               <mc:Choice xmlns:v="urn:schemas-microsoft-com:vml" Requires="v">
-                <p:oleObj spid="_x0000_s7546" name="Equation" r:id="rId35" imgW="291960" imgH="330120" progId="Equation.DSMT4">
+                <p:oleObj spid="_x0000_s7586" name="Equation" r:id="rId35" imgW="291960" imgH="330120" progId="Equation.DSMT4">
                   <p:embed/>
                 </p:oleObj>
               </mc:Choice>
@@ -20085,7 +20092,7 @@
           <a:graphicData uri="http://schemas.openxmlformats.org/presentationml/2006/ole">
             <mc:AlternateContent xmlns:mc="http://schemas.openxmlformats.org/markup-compatibility/2006">
               <mc:Choice xmlns:v="urn:schemas-microsoft-com:vml" Requires="v">
-                <p:oleObj spid="_x0000_s7547" name="Equation" r:id="rId37" imgW="380880" imgH="330120" progId="Equation.DSMT4">
+                <p:oleObj spid="_x0000_s7587" name="Equation" r:id="rId37" imgW="380880" imgH="330120" progId="Equation.DSMT4">
                   <p:embed/>
                 </p:oleObj>
               </mc:Choice>
@@ -20876,7 +20883,7 @@
             <a:graphicData uri="http://schemas.openxmlformats.org/presentationml/2006/ole">
               <mc:AlternateContent xmlns:mc="http://schemas.openxmlformats.org/markup-compatibility/2006">
                 <mc:Choice xmlns:v="urn:schemas-microsoft-com:vml" Requires="v">
-                  <p:oleObj spid="_x0000_s7548" name="Equation" r:id="rId39" imgW="164880" imgH="330120" progId="Equation.DSMT4">
+                  <p:oleObj spid="_x0000_s7588" name="Equation" r:id="rId39" imgW="164880" imgH="330120" progId="Equation.DSMT4">
                     <p:embed/>
                   </p:oleObj>
                 </mc:Choice>
@@ -21028,7 +21035,7 @@
             <a:graphicData uri="http://schemas.openxmlformats.org/presentationml/2006/ole">
               <mc:AlternateContent xmlns:mc="http://schemas.openxmlformats.org/markup-compatibility/2006">
                 <mc:Choice xmlns:v="urn:schemas-microsoft-com:vml" Requires="v">
-                  <p:oleObj spid="_x0000_s7549" name="Equation" r:id="rId41" imgW="355320" imgH="330120" progId="Equation.DSMT4">
+                  <p:oleObj spid="_x0000_s7589" name="Equation" r:id="rId41" imgW="355320" imgH="330120" progId="Equation.DSMT4">
                     <p:embed/>
                   </p:oleObj>
                 </mc:Choice>

</xml_diff>